<commit_message>
Update the version v0.1.6 readme file.
</commit_message>
<xml_diff>
--- a/doc/Introduction.pptx
+++ b/doc/Introduction.pptx
@@ -1020,14 +1020,6 @@
         <a:p>
           <a:pPr algn="l"/>
           <a:r>
-            <a:rPr lang="en-US" sz="1400" b="1" dirty="0">
-              <a:solidFill>
-                <a:schemeClr val="tx1"/>
-              </a:solidFill>
-            </a:rPr>
-            <a:t> </a:t>
-          </a:r>
-          <a:r>
             <a:rPr lang="en-SG" sz="1400" b="1" dirty="0">
               <a:solidFill>
                 <a:schemeClr val="tx1"/>
@@ -1133,6 +1125,9 @@
             <a:lumOff val="60000"/>
           </a:schemeClr>
         </a:solidFill>
+        <a:ln w="9525">
+          <a:prstDash val="dash"/>
+        </a:ln>
       </dgm:spPr>
     </dgm:pt>
     <dgm:pt modelId="{81E55278-75C0-4A94-B38E-071222D126C9}" type="pres">
@@ -1160,6 +1155,9 @@
             <a:lumOff val="60000"/>
           </a:schemeClr>
         </a:solidFill>
+        <a:ln w="9525">
+          <a:prstDash val="dash"/>
+        </a:ln>
       </dgm:spPr>
     </dgm:pt>
     <dgm:pt modelId="{F4B19634-2CEB-4349-8A29-25AE4DF81C74}" type="pres">
@@ -1187,6 +1185,9 @@
             <a:lumOff val="25000"/>
           </a:schemeClr>
         </a:solidFill>
+        <a:ln w="9525">
+          <a:prstDash val="dash"/>
+        </a:ln>
       </dgm:spPr>
     </dgm:pt>
     <dgm:pt modelId="{30DF41D3-8E3E-474A-AFB7-65C5B4759FED}" type="pres">
@@ -1214,6 +1215,9 @@
             <a:lumOff val="40000"/>
           </a:schemeClr>
         </a:solidFill>
+        <a:ln w="9525">
+          <a:prstDash val="dash"/>
+        </a:ln>
       </dgm:spPr>
     </dgm:pt>
     <dgm:pt modelId="{80788BE0-E541-4FFF-8B60-DC8145D63CDE}" type="pres">
@@ -1240,6 +1244,9 @@
             <a:lumMod val="65000"/>
           </a:schemeClr>
         </a:solidFill>
+        <a:ln w="9525">
+          <a:prstDash val="dash"/>
+        </a:ln>
       </dgm:spPr>
     </dgm:pt>
     <dgm:pt modelId="{02E1DBDB-10B0-4288-91A2-378C83D5294B}" type="pres">
@@ -1322,16 +1329,11 @@
             <a:lumOff val="60000"/>
           </a:schemeClr>
         </a:solidFill>
-        <a:ln w="19050" cap="flat" cmpd="sng" algn="ctr">
+        <a:ln w="9525" cap="flat" cmpd="sng" algn="ctr">
           <a:solidFill>
-            <a:schemeClr val="lt1">
-              <a:hueOff val="0"/>
-              <a:satOff val="0"/>
-              <a:lumOff val="0"/>
-              <a:alphaOff val="0"/>
-            </a:schemeClr>
+            <a:scrgbClr r="0" g="0" b="0"/>
           </a:solidFill>
-          <a:prstDash val="solid"/>
+          <a:prstDash val="dash"/>
           <a:miter lim="800000"/>
         </a:ln>
         <a:effectLst/>
@@ -1460,16 +1462,11 @@
             <a:lumOff val="60000"/>
           </a:schemeClr>
         </a:solidFill>
-        <a:ln w="19050" cap="flat" cmpd="sng" algn="ctr">
+        <a:ln w="9525" cap="flat" cmpd="sng" algn="ctr">
           <a:solidFill>
-            <a:schemeClr val="lt1">
-              <a:hueOff val="0"/>
-              <a:satOff val="0"/>
-              <a:lumOff val="0"/>
-              <a:alphaOff val="0"/>
-            </a:schemeClr>
+            <a:scrgbClr r="0" g="0" b="0"/>
           </a:solidFill>
-          <a:prstDash val="solid"/>
+          <a:prstDash val="dash"/>
           <a:miter lim="800000"/>
         </a:ln>
         <a:effectLst/>
@@ -1598,16 +1595,11 @@
             <a:lumOff val="25000"/>
           </a:schemeClr>
         </a:solidFill>
-        <a:ln w="19050" cap="flat" cmpd="sng" algn="ctr">
+        <a:ln w="9525" cap="flat" cmpd="sng" algn="ctr">
           <a:solidFill>
-            <a:schemeClr val="lt1">
-              <a:hueOff val="0"/>
-              <a:satOff val="0"/>
-              <a:lumOff val="0"/>
-              <a:alphaOff val="0"/>
-            </a:schemeClr>
+            <a:scrgbClr r="0" g="0" b="0"/>
           </a:solidFill>
-          <a:prstDash val="solid"/>
+          <a:prstDash val="dash"/>
           <a:miter lim="800000"/>
         </a:ln>
         <a:effectLst/>
@@ -1736,16 +1728,11 @@
             <a:lumOff val="40000"/>
           </a:schemeClr>
         </a:solidFill>
-        <a:ln w="19050" cap="flat" cmpd="sng" algn="ctr">
+        <a:ln w="9525" cap="flat" cmpd="sng" algn="ctr">
           <a:solidFill>
-            <a:schemeClr val="lt1">
-              <a:hueOff val="0"/>
-              <a:satOff val="0"/>
-              <a:lumOff val="0"/>
-              <a:alphaOff val="0"/>
-            </a:schemeClr>
+            <a:scrgbClr r="0" g="0" b="0"/>
           </a:solidFill>
-          <a:prstDash val="solid"/>
+          <a:prstDash val="dash"/>
           <a:miter lim="800000"/>
         </a:ln>
         <a:effectLst/>
@@ -1834,14 +1821,6 @@
             <a:buNone/>
           </a:pPr>
           <a:r>
-            <a:rPr lang="en-US" sz="1400" b="1" kern="1200" dirty="0">
-              <a:solidFill>
-                <a:schemeClr val="tx1"/>
-              </a:solidFill>
-            </a:rPr>
-            <a:t> </a:t>
-          </a:r>
-          <a:r>
             <a:rPr lang="en-SG" sz="1400" b="1" kern="1200" dirty="0">
               <a:solidFill>
                 <a:schemeClr val="tx1"/>
@@ -1881,16 +1860,11 @@
             <a:lumMod val="65000"/>
           </a:schemeClr>
         </a:solidFill>
-        <a:ln w="19050" cap="flat" cmpd="sng" algn="ctr">
+        <a:ln w="9525" cap="flat" cmpd="sng" algn="ctr">
           <a:solidFill>
-            <a:schemeClr val="lt1">
-              <a:hueOff val="0"/>
-              <a:satOff val="0"/>
-              <a:lumOff val="0"/>
-              <a:alphaOff val="0"/>
-            </a:schemeClr>
+            <a:scrgbClr r="0" g="0" b="0"/>
           </a:solidFill>
-          <a:prstDash val="solid"/>
+          <a:prstDash val="dash"/>
           <a:miter lim="800000"/>
         </a:ln>
         <a:effectLst/>
@@ -3279,7 +3253,7 @@
           <a:p>
             <a:fld id="{4C036ADD-D491-4F57-97F3-06818EDBCA02}" type="datetimeFigureOut">
               <a:rPr lang="en-SG" smtClean="0"/>
-              <a:t>11/3/2024</a:t>
+              <a:t>13/3/2024</a:t>
             </a:fld>
             <a:endParaRPr lang="en-SG"/>
           </a:p>
@@ -3864,7 +3838,7 @@
           <a:p>
             <a:fld id="{035E68B9-EEFB-48DA-857D-5D3BC6E19A78}" type="datetimeFigureOut">
               <a:rPr lang="en-SG" smtClean="0"/>
-              <a:t>11/3/2024</a:t>
+              <a:t>13/3/2024</a:t>
             </a:fld>
             <a:endParaRPr lang="en-SG"/>
           </a:p>
@@ -4064,7 +4038,7 @@
           <a:p>
             <a:fld id="{035E68B9-EEFB-48DA-857D-5D3BC6E19A78}" type="datetimeFigureOut">
               <a:rPr lang="en-SG" smtClean="0"/>
-              <a:t>11/3/2024</a:t>
+              <a:t>13/3/2024</a:t>
             </a:fld>
             <a:endParaRPr lang="en-SG"/>
           </a:p>
@@ -4274,7 +4248,7 @@
           <a:p>
             <a:fld id="{035E68B9-EEFB-48DA-857D-5D3BC6E19A78}" type="datetimeFigureOut">
               <a:rPr lang="en-SG" smtClean="0"/>
-              <a:t>11/3/2024</a:t>
+              <a:t>13/3/2024</a:t>
             </a:fld>
             <a:endParaRPr lang="en-SG"/>
           </a:p>
@@ -4474,7 +4448,7 @@
           <a:p>
             <a:fld id="{035E68B9-EEFB-48DA-857D-5D3BC6E19A78}" type="datetimeFigureOut">
               <a:rPr lang="en-SG" smtClean="0"/>
-              <a:t>11/3/2024</a:t>
+              <a:t>13/3/2024</a:t>
             </a:fld>
             <a:endParaRPr lang="en-SG"/>
           </a:p>
@@ -4750,7 +4724,7 @@
           <a:p>
             <a:fld id="{035E68B9-EEFB-48DA-857D-5D3BC6E19A78}" type="datetimeFigureOut">
               <a:rPr lang="en-SG" smtClean="0"/>
-              <a:t>11/3/2024</a:t>
+              <a:t>13/3/2024</a:t>
             </a:fld>
             <a:endParaRPr lang="en-SG"/>
           </a:p>
@@ -5018,7 +4992,7 @@
           <a:p>
             <a:fld id="{035E68B9-EEFB-48DA-857D-5D3BC6E19A78}" type="datetimeFigureOut">
               <a:rPr lang="en-SG" smtClean="0"/>
-              <a:t>11/3/2024</a:t>
+              <a:t>13/3/2024</a:t>
             </a:fld>
             <a:endParaRPr lang="en-SG"/>
           </a:p>
@@ -5433,7 +5407,7 @@
           <a:p>
             <a:fld id="{035E68B9-EEFB-48DA-857D-5D3BC6E19A78}" type="datetimeFigureOut">
               <a:rPr lang="en-SG" smtClean="0"/>
-              <a:t>11/3/2024</a:t>
+              <a:t>13/3/2024</a:t>
             </a:fld>
             <a:endParaRPr lang="en-SG"/>
           </a:p>
@@ -5575,7 +5549,7 @@
           <a:p>
             <a:fld id="{035E68B9-EEFB-48DA-857D-5D3BC6E19A78}" type="datetimeFigureOut">
               <a:rPr lang="en-SG" smtClean="0"/>
-              <a:t>11/3/2024</a:t>
+              <a:t>13/3/2024</a:t>
             </a:fld>
             <a:endParaRPr lang="en-SG"/>
           </a:p>
@@ -5688,7 +5662,7 @@
           <a:p>
             <a:fld id="{035E68B9-EEFB-48DA-857D-5D3BC6E19A78}" type="datetimeFigureOut">
               <a:rPr lang="en-SG" smtClean="0"/>
-              <a:t>11/3/2024</a:t>
+              <a:t>13/3/2024</a:t>
             </a:fld>
             <a:endParaRPr lang="en-SG"/>
           </a:p>
@@ -6001,7 +5975,7 @@
           <a:p>
             <a:fld id="{035E68B9-EEFB-48DA-857D-5D3BC6E19A78}" type="datetimeFigureOut">
               <a:rPr lang="en-SG" smtClean="0"/>
-              <a:t>11/3/2024</a:t>
+              <a:t>13/3/2024</a:t>
             </a:fld>
             <a:endParaRPr lang="en-SG"/>
           </a:p>
@@ -6290,7 +6264,7 @@
           <a:p>
             <a:fld id="{035E68B9-EEFB-48DA-857D-5D3BC6E19A78}" type="datetimeFigureOut">
               <a:rPr lang="en-SG" smtClean="0"/>
-              <a:t>11/3/2024</a:t>
+              <a:t>13/3/2024</a:t>
             </a:fld>
             <a:endParaRPr lang="en-SG"/>
           </a:p>
@@ -6533,7 +6507,7 @@
           <a:p>
             <a:fld id="{035E68B9-EEFB-48DA-857D-5D3BC6E19A78}" type="datetimeFigureOut">
               <a:rPr lang="en-SG" smtClean="0"/>
-              <a:t>11/3/2024</a:t>
+              <a:t>13/3/2024</a:t>
             </a:fld>
             <a:endParaRPr lang="en-SG"/>
           </a:p>
@@ -12135,7 +12109,7 @@
         <p:spPr>
           <a:xfrm>
             <a:off x="3748053" y="753167"/>
-            <a:ext cx="3745823" cy="1012571"/>
+            <a:ext cx="3848467" cy="1012571"/>
           </a:xfrm>
           <a:prstGeom prst="rect">
             <a:avLst/>
@@ -13142,7 +13116,7 @@
           <p:nvPr>
             <p:extLst>
               <p:ext uri="{D42A27DB-BD31-4B8C-83A1-F6EECF244321}">
-                <p14:modId xmlns:p14="http://schemas.microsoft.com/office/powerpoint/2010/main" val="4100057756"/>
+                <p14:modId xmlns:p14="http://schemas.microsoft.com/office/powerpoint/2010/main" val="2176637593"/>
               </p:ext>
             </p:extLst>
           </p:nvPr>
@@ -13269,7 +13243,7 @@
         </p:blipFill>
         <p:spPr>
           <a:xfrm>
-            <a:off x="6503666" y="867091"/>
+            <a:off x="6556216" y="867091"/>
             <a:ext cx="938851" cy="800570"/>
           </a:xfrm>
           <a:prstGeom prst="rect">
@@ -17096,12 +17070,20 @@
           <a:p>
             <a:pPr algn="ctr"/>
             <a:r>
+              <a:rPr lang="en-US" sz="1400" b="1">
+                <a:solidFill>
+                  <a:schemeClr val="tx1"/>
+                </a:solidFill>
+              </a:rPr>
+              <a:t>Cloud Orchestrator </a:t>
+            </a:r>
+            <a:r>
               <a:rPr lang="en-US" sz="1400" b="1" dirty="0">
                 <a:solidFill>
                   <a:schemeClr val="tx1"/>
                 </a:solidFill>
               </a:rPr>
-              <a:t>Could Orchestrator Server</a:t>
+              <a:t>Server</a:t>
             </a:r>
             <a:endParaRPr lang="en-SG" sz="1400" b="1" dirty="0">
               <a:solidFill>
@@ -24189,7 +24171,7 @@
                   <a:schemeClr val="tx1"/>
                 </a:solidFill>
               </a:rPr>
-              <a:t>Could Orchestrator server</a:t>
+              <a:t>Cloud Orchestrator server</a:t>
             </a:r>
             <a:endParaRPr lang="en-SG" sz="1400" b="1" dirty="0">
               <a:solidFill>
@@ -25431,6 +25413,41 @@
           </a:ln>
         </p:spPr>
       </p:pic>
+      <p:sp>
+        <p:nvSpPr>
+          <p:cNvPr id="3" name="TextBox 2">
+            <a:extLst>
+              <a:ext uri="{FF2B5EF4-FFF2-40B4-BE49-F238E27FC236}">
+                <a16:creationId xmlns:a16="http://schemas.microsoft.com/office/drawing/2014/main" id="{B73B7AC2-08F0-4DB8-A9C7-B5BEB8E4DE57}"/>
+              </a:ext>
+            </a:extLst>
+          </p:cNvPr>
+          <p:cNvSpPr txBox="1"/>
+          <p:nvPr/>
+        </p:nvSpPr>
+        <p:spPr>
+          <a:xfrm>
+            <a:off x="3476550" y="4810461"/>
+            <a:ext cx="652257" cy="400110"/>
+          </a:xfrm>
+          <a:prstGeom prst="rect">
+            <a:avLst/>
+          </a:prstGeom>
+          <a:noFill/>
+        </p:spPr>
+        <p:txBody>
+          <a:bodyPr wrap="square" rtlCol="0">
+            <a:spAutoFit/>
+          </a:bodyPr>
+          <a:lstStyle/>
+          <a:p>
+            <a:r>
+              <a:rPr lang="en-SG" sz="1000" b="1" dirty="0"/>
+              <a:t>Module import </a:t>
+            </a:r>
+          </a:p>
+        </p:txBody>
+      </p:sp>
     </p:spTree>
     <p:extLst>
       <p:ext uri="{BB962C8B-B14F-4D97-AF65-F5344CB8AC3E}">
@@ -25737,7 +25754,7 @@
           <a:p>
             <a:r>
               <a:rPr lang="en-US" sz="1600" b="1" dirty="0"/>
-              <a:t>Procedure Monitoring</a:t>
+              <a:t>Cyber Exercise Procedure Monitoring</a:t>
             </a:r>
           </a:p>
           <a:p>
@@ -25875,6 +25892,173 @@
           </a:p>
         </p:txBody>
       </p:sp>
+      <p:pic>
+        <p:nvPicPr>
+          <p:cNvPr id="3" name="Picture 2">
+            <a:extLst>
+              <a:ext uri="{FF2B5EF4-FFF2-40B4-BE49-F238E27FC236}">
+                <a16:creationId xmlns:a16="http://schemas.microsoft.com/office/drawing/2014/main" id="{BBA1F799-8E28-F1B4-9AF8-DCF6F9A6384B}"/>
+              </a:ext>
+            </a:extLst>
+          </p:cNvPr>
+          <p:cNvPicPr>
+            <a:picLocks noChangeAspect="1"/>
+          </p:cNvPicPr>
+          <p:nvPr/>
+        </p:nvPicPr>
+        <p:blipFill>
+          <a:blip r:embed="rId3"/>
+          <a:stretch>
+            <a:fillRect/>
+          </a:stretch>
+        </p:blipFill>
+        <p:spPr>
+          <a:xfrm>
+            <a:off x="8807953" y="1508947"/>
+            <a:ext cx="1618309" cy="733421"/>
+          </a:xfrm>
+          <a:prstGeom prst="rect">
+            <a:avLst/>
+          </a:prstGeom>
+        </p:spPr>
+      </p:pic>
+      <p:pic>
+        <p:nvPicPr>
+          <p:cNvPr id="8" name="Picture 7">
+            <a:extLst>
+              <a:ext uri="{FF2B5EF4-FFF2-40B4-BE49-F238E27FC236}">
+                <a16:creationId xmlns:a16="http://schemas.microsoft.com/office/drawing/2014/main" id="{7549B618-E375-A32B-E83F-3480042669CE}"/>
+              </a:ext>
+            </a:extLst>
+          </p:cNvPr>
+          <p:cNvPicPr>
+            <a:picLocks noChangeAspect="1"/>
+          </p:cNvPicPr>
+          <p:nvPr/>
+        </p:nvPicPr>
+        <p:blipFill>
+          <a:blip r:embed="rId4"/>
+          <a:stretch>
+            <a:fillRect/>
+          </a:stretch>
+        </p:blipFill>
+        <p:spPr>
+          <a:xfrm>
+            <a:off x="8807953" y="2472438"/>
+            <a:ext cx="1618309" cy="735200"/>
+          </a:xfrm>
+          <a:prstGeom prst="rect">
+            <a:avLst/>
+          </a:prstGeom>
+        </p:spPr>
+      </p:pic>
+      <p:pic>
+        <p:nvPicPr>
+          <p:cNvPr id="10" name="Picture 9">
+            <a:extLst>
+              <a:ext uri="{FF2B5EF4-FFF2-40B4-BE49-F238E27FC236}">
+                <a16:creationId xmlns:a16="http://schemas.microsoft.com/office/drawing/2014/main" id="{1354E4E7-2CE5-0F92-6236-997BCF53930F}"/>
+              </a:ext>
+            </a:extLst>
+          </p:cNvPr>
+          <p:cNvPicPr>
+            <a:picLocks noChangeAspect="1"/>
+          </p:cNvPicPr>
+          <p:nvPr/>
+        </p:nvPicPr>
+        <p:blipFill>
+          <a:blip r:embed="rId5"/>
+          <a:stretch>
+            <a:fillRect/>
+          </a:stretch>
+        </p:blipFill>
+        <p:spPr>
+          <a:xfrm>
+            <a:off x="10522562" y="3502573"/>
+            <a:ext cx="1330754" cy="638762"/>
+          </a:xfrm>
+          <a:prstGeom prst="rect">
+            <a:avLst/>
+          </a:prstGeom>
+        </p:spPr>
+      </p:pic>
+      <p:pic>
+        <p:nvPicPr>
+          <p:cNvPr id="12" name="Picture 11">
+            <a:extLst>
+              <a:ext uri="{FF2B5EF4-FFF2-40B4-BE49-F238E27FC236}">
+                <a16:creationId xmlns:a16="http://schemas.microsoft.com/office/drawing/2014/main" id="{9400FCA0-975B-B484-B74C-AF227D5D06D3}"/>
+              </a:ext>
+            </a:extLst>
+          </p:cNvPr>
+          <p:cNvPicPr>
+            <a:picLocks noChangeAspect="1"/>
+          </p:cNvPicPr>
+          <p:nvPr/>
+        </p:nvPicPr>
+        <p:blipFill>
+          <a:blip r:embed="rId6"/>
+          <a:stretch>
+            <a:fillRect/>
+          </a:stretch>
+        </p:blipFill>
+        <p:spPr>
+          <a:xfrm>
+            <a:off x="10522562" y="4503128"/>
+            <a:ext cx="1330754" cy="745222"/>
+          </a:xfrm>
+          <a:prstGeom prst="rect">
+            <a:avLst/>
+          </a:prstGeom>
+        </p:spPr>
+      </p:pic>
+      <p:pic>
+        <p:nvPicPr>
+          <p:cNvPr id="13" name="Picture 12" descr="National University of Singapore - Wikipedia">
+            <a:extLst>
+              <a:ext uri="{FF2B5EF4-FFF2-40B4-BE49-F238E27FC236}">
+                <a16:creationId xmlns:a16="http://schemas.microsoft.com/office/drawing/2014/main" id="{8A12763B-4C50-B4BE-7FBF-B9D062DFC597}"/>
+              </a:ext>
+            </a:extLst>
+          </p:cNvPr>
+          <p:cNvPicPr>
+            <a:picLocks noChangeAspect="1" noChangeArrowheads="1"/>
+          </p:cNvPicPr>
+          <p:nvPr/>
+        </p:nvPicPr>
+        <p:blipFill>
+          <a:blip r:embed="rId7">
+            <a:extLst>
+              <a:ext uri="{28A0092B-C50C-407E-A947-70E740481C1C}">
+                <a14:useLocalDpi xmlns:a14="http://schemas.microsoft.com/office/drawing/2010/main" val="0"/>
+              </a:ext>
+            </a:extLst>
+          </a:blip>
+          <a:srcRect/>
+          <a:stretch>
+            <a:fillRect/>
+          </a:stretch>
+        </p:blipFill>
+        <p:spPr bwMode="auto">
+          <a:xfrm>
+            <a:off x="10726219" y="5692714"/>
+            <a:ext cx="684731" cy="873609"/>
+          </a:xfrm>
+          <a:prstGeom prst="rect">
+            <a:avLst/>
+          </a:prstGeom>
+          <a:noFill/>
+          <a:extLst>
+            <a:ext uri="{909E8E84-426E-40DD-AFC4-6F175D3DCCD1}">
+              <a14:hiddenFill xmlns:a14="http://schemas.microsoft.com/office/drawing/2010/main">
+                <a:solidFill>
+                  <a:srgbClr val="FFFFFF"/>
+                </a:solidFill>
+              </a14:hiddenFill>
+            </a:ext>
+          </a:extLst>
+        </p:spPr>
+      </p:pic>
     </p:spTree>
     <p:extLst>
       <p:ext uri="{BB962C8B-B14F-4D97-AF65-F5344CB8AC3E}">

</xml_diff>